<commit_message>
Update del power point
</commit_message>
<xml_diff>
--- a/Home Switch Home.pptx
+++ b/Home Switch Home.pptx
@@ -11,7 +11,6 @@
     <p:sldId id="259" r:id="rId5"/>
     <p:sldId id="260" r:id="rId6"/>
     <p:sldId id="261" r:id="rId7"/>
-    <p:sldId id="262" r:id="rId8"/>
   </p:sldIdLst>
   <p:sldSz cx="12192000" cy="6858000"/>
   <p:notesSz cx="6858000" cy="9144000"/>
@@ -110,6 +109,11 @@
       </a:defRPr>
     </a:lvl9pPr>
   </p:defaultTextStyle>
+  <p:extLst>
+    <p:ext uri="{EFAFB233-063F-42B5-8137-9DF3F51BA10A}">
+      <p15:sldGuideLst xmlns:p15="http://schemas.microsoft.com/office/powerpoint/2012/main"/>
+    </p:ext>
+  </p:extLst>
 </p:presentation>
 </file>
 
@@ -262,7 +266,7 @@
           <a:p>
             <a:fld id="{C68F9BC8-3931-4FC3-B467-AD61A852D7E9}" type="datetimeFigureOut">
               <a:rPr lang="es-AR" smtClean="0"/>
-              <a:t>4/4/2019</a:t>
+              <a:t>6/4/2019</a:t>
             </a:fld>
             <a:endParaRPr lang="es-AR"/>
           </a:p>
@@ -462,7 +466,7 @@
           <a:p>
             <a:fld id="{C68F9BC8-3931-4FC3-B467-AD61A852D7E9}" type="datetimeFigureOut">
               <a:rPr lang="es-AR" smtClean="0"/>
-              <a:t>4/4/2019</a:t>
+              <a:t>6/4/2019</a:t>
             </a:fld>
             <a:endParaRPr lang="es-AR"/>
           </a:p>
@@ -672,7 +676,7 @@
           <a:p>
             <a:fld id="{C68F9BC8-3931-4FC3-B467-AD61A852D7E9}" type="datetimeFigureOut">
               <a:rPr lang="es-AR" smtClean="0"/>
-              <a:t>4/4/2019</a:t>
+              <a:t>6/4/2019</a:t>
             </a:fld>
             <a:endParaRPr lang="es-AR"/>
           </a:p>
@@ -872,7 +876,7 @@
           <a:p>
             <a:fld id="{C68F9BC8-3931-4FC3-B467-AD61A852D7E9}" type="datetimeFigureOut">
               <a:rPr lang="es-AR" smtClean="0"/>
-              <a:t>4/4/2019</a:t>
+              <a:t>6/4/2019</a:t>
             </a:fld>
             <a:endParaRPr lang="es-AR"/>
           </a:p>
@@ -1148,7 +1152,7 @@
           <a:p>
             <a:fld id="{C68F9BC8-3931-4FC3-B467-AD61A852D7E9}" type="datetimeFigureOut">
               <a:rPr lang="es-AR" smtClean="0"/>
-              <a:t>4/4/2019</a:t>
+              <a:t>6/4/2019</a:t>
             </a:fld>
             <a:endParaRPr lang="es-AR"/>
           </a:p>
@@ -1416,7 +1420,7 @@
           <a:p>
             <a:fld id="{C68F9BC8-3931-4FC3-B467-AD61A852D7E9}" type="datetimeFigureOut">
               <a:rPr lang="es-AR" smtClean="0"/>
-              <a:t>4/4/2019</a:t>
+              <a:t>6/4/2019</a:t>
             </a:fld>
             <a:endParaRPr lang="es-AR"/>
           </a:p>
@@ -1831,7 +1835,7 @@
           <a:p>
             <a:fld id="{C68F9BC8-3931-4FC3-B467-AD61A852D7E9}" type="datetimeFigureOut">
               <a:rPr lang="es-AR" smtClean="0"/>
-              <a:t>4/4/2019</a:t>
+              <a:t>6/4/2019</a:t>
             </a:fld>
             <a:endParaRPr lang="es-AR"/>
           </a:p>
@@ -1973,7 +1977,7 @@
           <a:p>
             <a:fld id="{C68F9BC8-3931-4FC3-B467-AD61A852D7E9}" type="datetimeFigureOut">
               <a:rPr lang="es-AR" smtClean="0"/>
-              <a:t>4/4/2019</a:t>
+              <a:t>6/4/2019</a:t>
             </a:fld>
             <a:endParaRPr lang="es-AR"/>
           </a:p>
@@ -2086,7 +2090,7 @@
           <a:p>
             <a:fld id="{C68F9BC8-3931-4FC3-B467-AD61A852D7E9}" type="datetimeFigureOut">
               <a:rPr lang="es-AR" smtClean="0"/>
-              <a:t>4/4/2019</a:t>
+              <a:t>6/4/2019</a:t>
             </a:fld>
             <a:endParaRPr lang="es-AR"/>
           </a:p>
@@ -2399,7 +2403,7 @@
           <a:p>
             <a:fld id="{C68F9BC8-3931-4FC3-B467-AD61A852D7E9}" type="datetimeFigureOut">
               <a:rPr lang="es-AR" smtClean="0"/>
-              <a:t>4/4/2019</a:t>
+              <a:t>6/4/2019</a:t>
             </a:fld>
             <a:endParaRPr lang="es-AR"/>
           </a:p>
@@ -2688,7 +2692,7 @@
           <a:p>
             <a:fld id="{C68F9BC8-3931-4FC3-B467-AD61A852D7E9}" type="datetimeFigureOut">
               <a:rPr lang="es-AR" smtClean="0"/>
-              <a:t>4/4/2019</a:t>
+              <a:t>6/4/2019</a:t>
             </a:fld>
             <a:endParaRPr lang="es-AR"/>
           </a:p>
@@ -2931,7 +2935,7 @@
           <a:p>
             <a:fld id="{C68F9BC8-3931-4FC3-B467-AD61A852D7E9}" type="datetimeFigureOut">
               <a:rPr lang="es-AR" smtClean="0"/>
-              <a:t>4/4/2019</a:t>
+              <a:t>6/4/2019</a:t>
             </a:fld>
             <a:endParaRPr lang="es-AR"/>
           </a:p>
@@ -3334,6 +3338,14 @@
 <file path=ppt/slides/slide1.xml><?xml version="1.0" encoding="utf-8"?>
 <p:sld xmlns:a="http://schemas.openxmlformats.org/drawingml/2006/main" xmlns:r="http://schemas.openxmlformats.org/officeDocument/2006/relationships" xmlns:p="http://schemas.openxmlformats.org/presentationml/2006/main">
   <p:cSld>
+    <p:bg>
+      <p:bgPr>
+        <a:solidFill>
+          <a:srgbClr val="DEDEDE"/>
+        </a:solidFill>
+        <a:effectLst/>
+      </p:bgPr>
+    </p:bg>
     <p:spTree>
       <p:nvGrpSpPr>
         <p:cNvPr id="1" name=""/>
@@ -3447,15 +3459,7 @@
             </a:r>
             <a:r>
               <a:rPr lang="es-AR" sz="3200" dirty="0"/>
-              <a:t> </a:t>
-            </a:r>
-            <a:r>
-              <a:rPr lang="es-AR" sz="3200" dirty="0" err="1"/>
-              <a:t>Matias</a:t>
-            </a:r>
-            <a:r>
-              <a:rPr lang="es-AR" sz="3200" dirty="0"/>
-              <a:t>, Canosa Leandro, Pugliese Alejo</a:t>
+              <a:t> Matías, Canosa Leandro, Pugliese Alejo</a:t>
             </a:r>
           </a:p>
         </p:txBody>
@@ -3470,12 +3474,175 @@
   <p:clrMapOvr>
     <a:masterClrMapping/>
   </p:clrMapOvr>
+  <p:timing>
+    <p:tnLst>
+      <p:par>
+        <p:cTn id="1" dur="indefinite" restart="never" nodeType="tmRoot">
+          <p:childTnLst>
+            <p:seq concurrent="1" nextAc="seek">
+              <p:cTn id="2" dur="indefinite" nodeType="mainSeq">
+                <p:childTnLst>
+                  <p:par>
+                    <p:cTn id="3" fill="hold">
+                      <p:stCondLst>
+                        <p:cond delay="indefinite"/>
+                      </p:stCondLst>
+                      <p:childTnLst>
+                        <p:par>
+                          <p:cTn id="4" fill="hold">
+                            <p:stCondLst>
+                              <p:cond delay="0"/>
+                            </p:stCondLst>
+                            <p:childTnLst>
+                              <p:par>
+                                <p:cTn id="5" presetID="6" presetClass="entr" presetSubtype="16" fill="hold" grpId="0" nodeType="clickEffect">
+                                  <p:stCondLst>
+                                    <p:cond delay="0"/>
+                                  </p:stCondLst>
+                                  <p:childTnLst>
+                                    <p:set>
+                                      <p:cBhvr>
+                                        <p:cTn id="6" dur="1" fill="hold">
+                                          <p:stCondLst>
+                                            <p:cond delay="0"/>
+                                          </p:stCondLst>
+                                        </p:cTn>
+                                        <p:tgtEl>
+                                          <p:spTgt spid="3">
+                                            <p:txEl>
+                                              <p:pRg st="1" end="1"/>
+                                            </p:txEl>
+                                          </p:spTgt>
+                                        </p:tgtEl>
+                                        <p:attrNameLst>
+                                          <p:attrName>style.visibility</p:attrName>
+                                        </p:attrNameLst>
+                                      </p:cBhvr>
+                                      <p:to>
+                                        <p:strVal val="visible"/>
+                                      </p:to>
+                                    </p:set>
+                                    <p:animEffect transition="in" filter="circle(in)">
+                                      <p:cBhvr>
+                                        <p:cTn id="7" dur="2000"/>
+                                        <p:tgtEl>
+                                          <p:spTgt spid="3">
+                                            <p:txEl>
+                                              <p:pRg st="1" end="1"/>
+                                            </p:txEl>
+                                          </p:spTgt>
+                                        </p:tgtEl>
+                                      </p:cBhvr>
+                                    </p:animEffect>
+                                  </p:childTnLst>
+                                </p:cTn>
+                              </p:par>
+                            </p:childTnLst>
+                          </p:cTn>
+                        </p:par>
+                      </p:childTnLst>
+                    </p:cTn>
+                  </p:par>
+                  <p:par>
+                    <p:cTn id="8" fill="hold">
+                      <p:stCondLst>
+                        <p:cond delay="indefinite"/>
+                      </p:stCondLst>
+                      <p:childTnLst>
+                        <p:par>
+                          <p:cTn id="9" fill="hold">
+                            <p:stCondLst>
+                              <p:cond delay="0"/>
+                            </p:stCondLst>
+                            <p:childTnLst>
+                              <p:par>
+                                <p:cTn id="10" presetID="6" presetClass="entr" presetSubtype="16" fill="hold" grpId="0" nodeType="clickEffect">
+                                  <p:stCondLst>
+                                    <p:cond delay="0"/>
+                                  </p:stCondLst>
+                                  <p:childTnLst>
+                                    <p:set>
+                                      <p:cBhvr>
+                                        <p:cTn id="11" dur="1" fill="hold">
+                                          <p:stCondLst>
+                                            <p:cond delay="0"/>
+                                          </p:stCondLst>
+                                        </p:cTn>
+                                        <p:tgtEl>
+                                          <p:spTgt spid="3">
+                                            <p:txEl>
+                                              <p:pRg st="5" end="5"/>
+                                            </p:txEl>
+                                          </p:spTgt>
+                                        </p:tgtEl>
+                                        <p:attrNameLst>
+                                          <p:attrName>style.visibility</p:attrName>
+                                        </p:attrNameLst>
+                                      </p:cBhvr>
+                                      <p:to>
+                                        <p:strVal val="visible"/>
+                                      </p:to>
+                                    </p:set>
+                                    <p:animEffect transition="in" filter="circle(in)">
+                                      <p:cBhvr>
+                                        <p:cTn id="12" dur="2000"/>
+                                        <p:tgtEl>
+                                          <p:spTgt spid="3">
+                                            <p:txEl>
+                                              <p:pRg st="5" end="5"/>
+                                            </p:txEl>
+                                          </p:spTgt>
+                                        </p:tgtEl>
+                                      </p:cBhvr>
+                                    </p:animEffect>
+                                  </p:childTnLst>
+                                </p:cTn>
+                              </p:par>
+                            </p:childTnLst>
+                          </p:cTn>
+                        </p:par>
+                      </p:childTnLst>
+                    </p:cTn>
+                  </p:par>
+                </p:childTnLst>
+              </p:cTn>
+              <p:prevCondLst>
+                <p:cond evt="onPrev" delay="0">
+                  <p:tgtEl>
+                    <p:sldTgt/>
+                  </p:tgtEl>
+                </p:cond>
+              </p:prevCondLst>
+              <p:nextCondLst>
+                <p:cond evt="onNext" delay="0">
+                  <p:tgtEl>
+                    <p:sldTgt/>
+                  </p:tgtEl>
+                </p:cond>
+              </p:nextCondLst>
+            </p:seq>
+          </p:childTnLst>
+        </p:cTn>
+      </p:par>
+    </p:tnLst>
+    <p:bldLst>
+      <p:bldP spid="3" grpId="0" build="p"/>
+    </p:bldLst>
+  </p:timing>
 </p:sld>
 </file>
 
 <file path=ppt/slides/slide2.xml><?xml version="1.0" encoding="utf-8"?>
 <p:sld xmlns:a="http://schemas.openxmlformats.org/drawingml/2006/main" xmlns:r="http://schemas.openxmlformats.org/officeDocument/2006/relationships" xmlns:p="http://schemas.openxmlformats.org/presentationml/2006/main">
   <p:cSld>
+    <p:bg>
+      <p:bgPr>
+        <a:solidFill>
+          <a:srgbClr val="D8F9FC"/>
+        </a:solidFill>
+        <a:effectLst/>
+      </p:bgPr>
+    </p:bg>
     <p:spTree>
       <p:nvGrpSpPr>
         <p:cNvPr id="1" name=""/>
@@ -3613,12 +3780,300 @@
   <p:clrMapOvr>
     <a:masterClrMapping/>
   </p:clrMapOvr>
+  <p:timing>
+    <p:tnLst>
+      <p:par>
+        <p:cTn id="1" dur="indefinite" restart="never" nodeType="tmRoot">
+          <p:childTnLst>
+            <p:seq concurrent="1" nextAc="seek">
+              <p:cTn id="2" dur="indefinite" nodeType="mainSeq">
+                <p:childTnLst>
+                  <p:par>
+                    <p:cTn id="3" fill="hold">
+                      <p:stCondLst>
+                        <p:cond delay="indefinite"/>
+                      </p:stCondLst>
+                      <p:childTnLst>
+                        <p:par>
+                          <p:cTn id="4" fill="hold">
+                            <p:stCondLst>
+                              <p:cond delay="0"/>
+                            </p:stCondLst>
+                            <p:childTnLst>
+                              <p:par>
+                                <p:cTn id="5" presetID="22" presetClass="entr" presetSubtype="4" fill="hold" grpId="0" nodeType="clickEffect">
+                                  <p:stCondLst>
+                                    <p:cond delay="0"/>
+                                  </p:stCondLst>
+                                  <p:childTnLst>
+                                    <p:set>
+                                      <p:cBhvr>
+                                        <p:cTn id="6" dur="1" fill="hold">
+                                          <p:stCondLst>
+                                            <p:cond delay="0"/>
+                                          </p:stCondLst>
+                                        </p:cTn>
+                                        <p:tgtEl>
+                                          <p:spTgt spid="3">
+                                            <p:txEl>
+                                              <p:pRg st="0" end="0"/>
+                                            </p:txEl>
+                                          </p:spTgt>
+                                        </p:tgtEl>
+                                        <p:attrNameLst>
+                                          <p:attrName>style.visibility</p:attrName>
+                                        </p:attrNameLst>
+                                      </p:cBhvr>
+                                      <p:to>
+                                        <p:strVal val="visible"/>
+                                      </p:to>
+                                    </p:set>
+                                    <p:animEffect transition="in" filter="wipe(down)">
+                                      <p:cBhvr>
+                                        <p:cTn id="7" dur="500"/>
+                                        <p:tgtEl>
+                                          <p:spTgt spid="3">
+                                            <p:txEl>
+                                              <p:pRg st="0" end="0"/>
+                                            </p:txEl>
+                                          </p:spTgt>
+                                        </p:tgtEl>
+                                      </p:cBhvr>
+                                    </p:animEffect>
+                                  </p:childTnLst>
+                                </p:cTn>
+                              </p:par>
+                            </p:childTnLst>
+                          </p:cTn>
+                        </p:par>
+                      </p:childTnLst>
+                    </p:cTn>
+                  </p:par>
+                  <p:par>
+                    <p:cTn id="8" fill="hold">
+                      <p:stCondLst>
+                        <p:cond delay="indefinite"/>
+                      </p:stCondLst>
+                      <p:childTnLst>
+                        <p:par>
+                          <p:cTn id="9" fill="hold">
+                            <p:stCondLst>
+                              <p:cond delay="0"/>
+                            </p:stCondLst>
+                            <p:childTnLst>
+                              <p:par>
+                                <p:cTn id="10" presetID="22" presetClass="entr" presetSubtype="4" fill="hold" grpId="0" nodeType="clickEffect">
+                                  <p:stCondLst>
+                                    <p:cond delay="0"/>
+                                  </p:stCondLst>
+                                  <p:childTnLst>
+                                    <p:set>
+                                      <p:cBhvr>
+                                        <p:cTn id="11" dur="1" fill="hold">
+                                          <p:stCondLst>
+                                            <p:cond delay="0"/>
+                                          </p:stCondLst>
+                                        </p:cTn>
+                                        <p:tgtEl>
+                                          <p:spTgt spid="3">
+                                            <p:txEl>
+                                              <p:pRg st="2" end="2"/>
+                                            </p:txEl>
+                                          </p:spTgt>
+                                        </p:tgtEl>
+                                        <p:attrNameLst>
+                                          <p:attrName>style.visibility</p:attrName>
+                                        </p:attrNameLst>
+                                      </p:cBhvr>
+                                      <p:to>
+                                        <p:strVal val="visible"/>
+                                      </p:to>
+                                    </p:set>
+                                    <p:animEffect transition="in" filter="wipe(down)">
+                                      <p:cBhvr>
+                                        <p:cTn id="12" dur="500"/>
+                                        <p:tgtEl>
+                                          <p:spTgt spid="3">
+                                            <p:txEl>
+                                              <p:pRg st="2" end="2"/>
+                                            </p:txEl>
+                                          </p:spTgt>
+                                        </p:tgtEl>
+                                      </p:cBhvr>
+                                    </p:animEffect>
+                                  </p:childTnLst>
+                                </p:cTn>
+                              </p:par>
+                            </p:childTnLst>
+                          </p:cTn>
+                        </p:par>
+                      </p:childTnLst>
+                    </p:cTn>
+                  </p:par>
+                  <p:par>
+                    <p:cTn id="13" fill="hold">
+                      <p:stCondLst>
+                        <p:cond delay="indefinite"/>
+                      </p:stCondLst>
+                      <p:childTnLst>
+                        <p:par>
+                          <p:cTn id="14" fill="hold">
+                            <p:stCondLst>
+                              <p:cond delay="0"/>
+                            </p:stCondLst>
+                            <p:childTnLst>
+                              <p:par>
+                                <p:cTn id="15" presetID="22" presetClass="entr" presetSubtype="4" fill="hold" grpId="0" nodeType="clickEffect">
+                                  <p:stCondLst>
+                                    <p:cond delay="0"/>
+                                  </p:stCondLst>
+                                  <p:childTnLst>
+                                    <p:set>
+                                      <p:cBhvr>
+                                        <p:cTn id="16" dur="1" fill="hold">
+                                          <p:stCondLst>
+                                            <p:cond delay="0"/>
+                                          </p:stCondLst>
+                                        </p:cTn>
+                                        <p:tgtEl>
+                                          <p:spTgt spid="3">
+                                            <p:txEl>
+                                              <p:pRg st="4" end="4"/>
+                                            </p:txEl>
+                                          </p:spTgt>
+                                        </p:tgtEl>
+                                        <p:attrNameLst>
+                                          <p:attrName>style.visibility</p:attrName>
+                                        </p:attrNameLst>
+                                      </p:cBhvr>
+                                      <p:to>
+                                        <p:strVal val="visible"/>
+                                      </p:to>
+                                    </p:set>
+                                    <p:animEffect transition="in" filter="wipe(down)">
+                                      <p:cBhvr>
+                                        <p:cTn id="17" dur="500"/>
+                                        <p:tgtEl>
+                                          <p:spTgt spid="3">
+                                            <p:txEl>
+                                              <p:pRg st="4" end="4"/>
+                                            </p:txEl>
+                                          </p:spTgt>
+                                        </p:tgtEl>
+                                      </p:cBhvr>
+                                    </p:animEffect>
+                                  </p:childTnLst>
+                                </p:cTn>
+                              </p:par>
+                            </p:childTnLst>
+                          </p:cTn>
+                        </p:par>
+                      </p:childTnLst>
+                    </p:cTn>
+                  </p:par>
+                  <p:par>
+                    <p:cTn id="18" fill="hold">
+                      <p:stCondLst>
+                        <p:cond delay="indefinite"/>
+                      </p:stCondLst>
+                      <p:childTnLst>
+                        <p:par>
+                          <p:cTn id="19" fill="hold">
+                            <p:stCondLst>
+                              <p:cond delay="0"/>
+                            </p:stCondLst>
+                            <p:childTnLst>
+                              <p:par>
+                                <p:cTn id="20" presetID="22" presetClass="entr" presetSubtype="4" fill="hold" grpId="0" nodeType="clickEffect">
+                                  <p:stCondLst>
+                                    <p:cond delay="0"/>
+                                  </p:stCondLst>
+                                  <p:childTnLst>
+                                    <p:set>
+                                      <p:cBhvr>
+                                        <p:cTn id="21" dur="1" fill="hold">
+                                          <p:stCondLst>
+                                            <p:cond delay="0"/>
+                                          </p:stCondLst>
+                                        </p:cTn>
+                                        <p:tgtEl>
+                                          <p:spTgt spid="3">
+                                            <p:txEl>
+                                              <p:pRg st="6" end="6"/>
+                                            </p:txEl>
+                                          </p:spTgt>
+                                        </p:tgtEl>
+                                        <p:attrNameLst>
+                                          <p:attrName>style.visibility</p:attrName>
+                                        </p:attrNameLst>
+                                      </p:cBhvr>
+                                      <p:to>
+                                        <p:strVal val="visible"/>
+                                      </p:to>
+                                    </p:set>
+                                    <p:animEffect transition="in" filter="wipe(down)">
+                                      <p:cBhvr>
+                                        <p:cTn id="22" dur="500"/>
+                                        <p:tgtEl>
+                                          <p:spTgt spid="3">
+                                            <p:txEl>
+                                              <p:pRg st="6" end="6"/>
+                                            </p:txEl>
+                                          </p:spTgt>
+                                        </p:tgtEl>
+                                      </p:cBhvr>
+                                    </p:animEffect>
+                                  </p:childTnLst>
+                                </p:cTn>
+                              </p:par>
+                            </p:childTnLst>
+                          </p:cTn>
+                        </p:par>
+                      </p:childTnLst>
+                    </p:cTn>
+                  </p:par>
+                </p:childTnLst>
+              </p:cTn>
+              <p:prevCondLst>
+                <p:cond evt="onPrev" delay="0">
+                  <p:tgtEl>
+                    <p:sldTgt/>
+                  </p:tgtEl>
+                </p:cond>
+              </p:prevCondLst>
+              <p:nextCondLst>
+                <p:cond evt="onNext" delay="0">
+                  <p:tgtEl>
+                    <p:sldTgt/>
+                  </p:tgtEl>
+                </p:cond>
+              </p:nextCondLst>
+            </p:seq>
+          </p:childTnLst>
+        </p:cTn>
+      </p:par>
+    </p:tnLst>
+    <p:bldLst>
+      <p:bldP spid="3" grpId="0" build="p"/>
+    </p:bldLst>
+  </p:timing>
 </p:sld>
 </file>
 
 <file path=ppt/slides/slide3.xml><?xml version="1.0" encoding="utf-8"?>
 <p:sld xmlns:a="http://schemas.openxmlformats.org/drawingml/2006/main" xmlns:r="http://schemas.openxmlformats.org/officeDocument/2006/relationships" xmlns:p="http://schemas.openxmlformats.org/presentationml/2006/main">
   <p:cSld>
+    <p:bg>
+      <p:bgPr>
+        <a:solidFill>
+          <a:schemeClr val="accent2">
+            <a:lumMod val="20000"/>
+            <a:lumOff val="80000"/>
+          </a:schemeClr>
+        </a:solidFill>
+        <a:effectLst/>
+      </p:bgPr>
+    </p:bg>
     <p:spTree>
       <p:nvGrpSpPr>
         <p:cNvPr id="1" name=""/>
@@ -3784,12 +4239,300 @@
   <p:clrMapOvr>
     <a:masterClrMapping/>
   </p:clrMapOvr>
+  <p:timing>
+    <p:tnLst>
+      <p:par>
+        <p:cTn id="1" dur="indefinite" restart="never" nodeType="tmRoot">
+          <p:childTnLst>
+            <p:seq concurrent="1" nextAc="seek">
+              <p:cTn id="2" dur="indefinite" nodeType="mainSeq">
+                <p:childTnLst>
+                  <p:par>
+                    <p:cTn id="3" fill="hold">
+                      <p:stCondLst>
+                        <p:cond delay="indefinite"/>
+                      </p:stCondLst>
+                      <p:childTnLst>
+                        <p:par>
+                          <p:cTn id="4" fill="hold">
+                            <p:stCondLst>
+                              <p:cond delay="0"/>
+                            </p:stCondLst>
+                            <p:childTnLst>
+                              <p:par>
+                                <p:cTn id="5" presetID="22" presetClass="entr" presetSubtype="4" fill="hold" grpId="0" nodeType="clickEffect">
+                                  <p:stCondLst>
+                                    <p:cond delay="0"/>
+                                  </p:stCondLst>
+                                  <p:childTnLst>
+                                    <p:set>
+                                      <p:cBhvr>
+                                        <p:cTn id="6" dur="1" fill="hold">
+                                          <p:stCondLst>
+                                            <p:cond delay="0"/>
+                                          </p:stCondLst>
+                                        </p:cTn>
+                                        <p:tgtEl>
+                                          <p:spTgt spid="3">
+                                            <p:txEl>
+                                              <p:pRg st="1" end="1"/>
+                                            </p:txEl>
+                                          </p:spTgt>
+                                        </p:tgtEl>
+                                        <p:attrNameLst>
+                                          <p:attrName>style.visibility</p:attrName>
+                                        </p:attrNameLst>
+                                      </p:cBhvr>
+                                      <p:to>
+                                        <p:strVal val="visible"/>
+                                      </p:to>
+                                    </p:set>
+                                    <p:animEffect transition="in" filter="wipe(down)">
+                                      <p:cBhvr>
+                                        <p:cTn id="7" dur="500"/>
+                                        <p:tgtEl>
+                                          <p:spTgt spid="3">
+                                            <p:txEl>
+                                              <p:pRg st="1" end="1"/>
+                                            </p:txEl>
+                                          </p:spTgt>
+                                        </p:tgtEl>
+                                      </p:cBhvr>
+                                    </p:animEffect>
+                                  </p:childTnLst>
+                                </p:cTn>
+                              </p:par>
+                            </p:childTnLst>
+                          </p:cTn>
+                        </p:par>
+                      </p:childTnLst>
+                    </p:cTn>
+                  </p:par>
+                  <p:par>
+                    <p:cTn id="8" fill="hold">
+                      <p:stCondLst>
+                        <p:cond delay="indefinite"/>
+                      </p:stCondLst>
+                      <p:childTnLst>
+                        <p:par>
+                          <p:cTn id="9" fill="hold">
+                            <p:stCondLst>
+                              <p:cond delay="0"/>
+                            </p:stCondLst>
+                            <p:childTnLst>
+                              <p:par>
+                                <p:cTn id="10" presetID="22" presetClass="entr" presetSubtype="4" fill="hold" grpId="0" nodeType="clickEffect">
+                                  <p:stCondLst>
+                                    <p:cond delay="0"/>
+                                  </p:stCondLst>
+                                  <p:childTnLst>
+                                    <p:set>
+                                      <p:cBhvr>
+                                        <p:cTn id="11" dur="1" fill="hold">
+                                          <p:stCondLst>
+                                            <p:cond delay="0"/>
+                                          </p:stCondLst>
+                                        </p:cTn>
+                                        <p:tgtEl>
+                                          <p:spTgt spid="3">
+                                            <p:txEl>
+                                              <p:pRg st="3" end="3"/>
+                                            </p:txEl>
+                                          </p:spTgt>
+                                        </p:tgtEl>
+                                        <p:attrNameLst>
+                                          <p:attrName>style.visibility</p:attrName>
+                                        </p:attrNameLst>
+                                      </p:cBhvr>
+                                      <p:to>
+                                        <p:strVal val="visible"/>
+                                      </p:to>
+                                    </p:set>
+                                    <p:animEffect transition="in" filter="wipe(down)">
+                                      <p:cBhvr>
+                                        <p:cTn id="12" dur="500"/>
+                                        <p:tgtEl>
+                                          <p:spTgt spid="3">
+                                            <p:txEl>
+                                              <p:pRg st="3" end="3"/>
+                                            </p:txEl>
+                                          </p:spTgt>
+                                        </p:tgtEl>
+                                      </p:cBhvr>
+                                    </p:animEffect>
+                                  </p:childTnLst>
+                                </p:cTn>
+                              </p:par>
+                            </p:childTnLst>
+                          </p:cTn>
+                        </p:par>
+                      </p:childTnLst>
+                    </p:cTn>
+                  </p:par>
+                  <p:par>
+                    <p:cTn id="13" fill="hold">
+                      <p:stCondLst>
+                        <p:cond delay="indefinite"/>
+                      </p:stCondLst>
+                      <p:childTnLst>
+                        <p:par>
+                          <p:cTn id="14" fill="hold">
+                            <p:stCondLst>
+                              <p:cond delay="0"/>
+                            </p:stCondLst>
+                            <p:childTnLst>
+                              <p:par>
+                                <p:cTn id="15" presetID="22" presetClass="entr" presetSubtype="4" fill="hold" grpId="0" nodeType="clickEffect">
+                                  <p:stCondLst>
+                                    <p:cond delay="0"/>
+                                  </p:stCondLst>
+                                  <p:childTnLst>
+                                    <p:set>
+                                      <p:cBhvr>
+                                        <p:cTn id="16" dur="1" fill="hold">
+                                          <p:stCondLst>
+                                            <p:cond delay="0"/>
+                                          </p:stCondLst>
+                                        </p:cTn>
+                                        <p:tgtEl>
+                                          <p:spTgt spid="3">
+                                            <p:txEl>
+                                              <p:pRg st="5" end="5"/>
+                                            </p:txEl>
+                                          </p:spTgt>
+                                        </p:tgtEl>
+                                        <p:attrNameLst>
+                                          <p:attrName>style.visibility</p:attrName>
+                                        </p:attrNameLst>
+                                      </p:cBhvr>
+                                      <p:to>
+                                        <p:strVal val="visible"/>
+                                      </p:to>
+                                    </p:set>
+                                    <p:animEffect transition="in" filter="wipe(down)">
+                                      <p:cBhvr>
+                                        <p:cTn id="17" dur="500"/>
+                                        <p:tgtEl>
+                                          <p:spTgt spid="3">
+                                            <p:txEl>
+                                              <p:pRg st="5" end="5"/>
+                                            </p:txEl>
+                                          </p:spTgt>
+                                        </p:tgtEl>
+                                      </p:cBhvr>
+                                    </p:animEffect>
+                                  </p:childTnLst>
+                                </p:cTn>
+                              </p:par>
+                            </p:childTnLst>
+                          </p:cTn>
+                        </p:par>
+                      </p:childTnLst>
+                    </p:cTn>
+                  </p:par>
+                  <p:par>
+                    <p:cTn id="18" fill="hold">
+                      <p:stCondLst>
+                        <p:cond delay="indefinite"/>
+                      </p:stCondLst>
+                      <p:childTnLst>
+                        <p:par>
+                          <p:cTn id="19" fill="hold">
+                            <p:stCondLst>
+                              <p:cond delay="0"/>
+                            </p:stCondLst>
+                            <p:childTnLst>
+                              <p:par>
+                                <p:cTn id="20" presetID="22" presetClass="entr" presetSubtype="4" fill="hold" grpId="0" nodeType="clickEffect">
+                                  <p:stCondLst>
+                                    <p:cond delay="0"/>
+                                  </p:stCondLst>
+                                  <p:childTnLst>
+                                    <p:set>
+                                      <p:cBhvr>
+                                        <p:cTn id="21" dur="1" fill="hold">
+                                          <p:stCondLst>
+                                            <p:cond delay="0"/>
+                                          </p:stCondLst>
+                                        </p:cTn>
+                                        <p:tgtEl>
+                                          <p:spTgt spid="3">
+                                            <p:txEl>
+                                              <p:pRg st="7" end="7"/>
+                                            </p:txEl>
+                                          </p:spTgt>
+                                        </p:tgtEl>
+                                        <p:attrNameLst>
+                                          <p:attrName>style.visibility</p:attrName>
+                                        </p:attrNameLst>
+                                      </p:cBhvr>
+                                      <p:to>
+                                        <p:strVal val="visible"/>
+                                      </p:to>
+                                    </p:set>
+                                    <p:animEffect transition="in" filter="wipe(down)">
+                                      <p:cBhvr>
+                                        <p:cTn id="22" dur="500"/>
+                                        <p:tgtEl>
+                                          <p:spTgt spid="3">
+                                            <p:txEl>
+                                              <p:pRg st="7" end="7"/>
+                                            </p:txEl>
+                                          </p:spTgt>
+                                        </p:tgtEl>
+                                      </p:cBhvr>
+                                    </p:animEffect>
+                                  </p:childTnLst>
+                                </p:cTn>
+                              </p:par>
+                            </p:childTnLst>
+                          </p:cTn>
+                        </p:par>
+                      </p:childTnLst>
+                    </p:cTn>
+                  </p:par>
+                </p:childTnLst>
+              </p:cTn>
+              <p:prevCondLst>
+                <p:cond evt="onPrev" delay="0">
+                  <p:tgtEl>
+                    <p:sldTgt/>
+                  </p:tgtEl>
+                </p:cond>
+              </p:prevCondLst>
+              <p:nextCondLst>
+                <p:cond evt="onNext" delay="0">
+                  <p:tgtEl>
+                    <p:sldTgt/>
+                  </p:tgtEl>
+                </p:cond>
+              </p:nextCondLst>
+            </p:seq>
+          </p:childTnLst>
+        </p:cTn>
+      </p:par>
+    </p:tnLst>
+    <p:bldLst>
+      <p:bldP spid="3" grpId="0" build="p"/>
+    </p:bldLst>
+  </p:timing>
 </p:sld>
 </file>
 
 <file path=ppt/slides/slide4.xml><?xml version="1.0" encoding="utf-8"?>
 <p:sld xmlns:a="http://schemas.openxmlformats.org/drawingml/2006/main" xmlns:r="http://schemas.openxmlformats.org/officeDocument/2006/relationships" xmlns:p="http://schemas.openxmlformats.org/presentationml/2006/main">
   <p:cSld>
+    <p:bg>
+      <p:bgPr>
+        <a:solidFill>
+          <a:schemeClr val="accent4">
+            <a:lumMod val="20000"/>
+            <a:lumOff val="80000"/>
+          </a:schemeClr>
+        </a:solidFill>
+        <a:effectLst/>
+      </p:bgPr>
+    </p:bg>
     <p:spTree>
       <p:nvGrpSpPr>
         <p:cNvPr id="1" name=""/>
@@ -3926,12 +4669,300 @@
   <p:clrMapOvr>
     <a:masterClrMapping/>
   </p:clrMapOvr>
+  <p:timing>
+    <p:tnLst>
+      <p:par>
+        <p:cTn id="1" dur="indefinite" restart="never" nodeType="tmRoot">
+          <p:childTnLst>
+            <p:seq concurrent="1" nextAc="seek">
+              <p:cTn id="2" dur="indefinite" nodeType="mainSeq">
+                <p:childTnLst>
+                  <p:par>
+                    <p:cTn id="3" fill="hold">
+                      <p:stCondLst>
+                        <p:cond delay="indefinite"/>
+                      </p:stCondLst>
+                      <p:childTnLst>
+                        <p:par>
+                          <p:cTn id="4" fill="hold">
+                            <p:stCondLst>
+                              <p:cond delay="0"/>
+                            </p:stCondLst>
+                            <p:childTnLst>
+                              <p:par>
+                                <p:cTn id="5" presetID="22" presetClass="entr" presetSubtype="4" fill="hold" grpId="0" nodeType="clickEffect">
+                                  <p:stCondLst>
+                                    <p:cond delay="0"/>
+                                  </p:stCondLst>
+                                  <p:childTnLst>
+                                    <p:set>
+                                      <p:cBhvr>
+                                        <p:cTn id="6" dur="1" fill="hold">
+                                          <p:stCondLst>
+                                            <p:cond delay="0"/>
+                                          </p:stCondLst>
+                                        </p:cTn>
+                                        <p:tgtEl>
+                                          <p:spTgt spid="3">
+                                            <p:txEl>
+                                              <p:pRg st="0" end="0"/>
+                                            </p:txEl>
+                                          </p:spTgt>
+                                        </p:tgtEl>
+                                        <p:attrNameLst>
+                                          <p:attrName>style.visibility</p:attrName>
+                                        </p:attrNameLst>
+                                      </p:cBhvr>
+                                      <p:to>
+                                        <p:strVal val="visible"/>
+                                      </p:to>
+                                    </p:set>
+                                    <p:animEffect transition="in" filter="wipe(down)">
+                                      <p:cBhvr>
+                                        <p:cTn id="7" dur="500"/>
+                                        <p:tgtEl>
+                                          <p:spTgt spid="3">
+                                            <p:txEl>
+                                              <p:pRg st="0" end="0"/>
+                                            </p:txEl>
+                                          </p:spTgt>
+                                        </p:tgtEl>
+                                      </p:cBhvr>
+                                    </p:animEffect>
+                                  </p:childTnLst>
+                                </p:cTn>
+                              </p:par>
+                            </p:childTnLst>
+                          </p:cTn>
+                        </p:par>
+                      </p:childTnLst>
+                    </p:cTn>
+                  </p:par>
+                  <p:par>
+                    <p:cTn id="8" fill="hold">
+                      <p:stCondLst>
+                        <p:cond delay="indefinite"/>
+                      </p:stCondLst>
+                      <p:childTnLst>
+                        <p:par>
+                          <p:cTn id="9" fill="hold">
+                            <p:stCondLst>
+                              <p:cond delay="0"/>
+                            </p:stCondLst>
+                            <p:childTnLst>
+                              <p:par>
+                                <p:cTn id="10" presetID="22" presetClass="entr" presetSubtype="4" fill="hold" grpId="0" nodeType="clickEffect">
+                                  <p:stCondLst>
+                                    <p:cond delay="0"/>
+                                  </p:stCondLst>
+                                  <p:childTnLst>
+                                    <p:set>
+                                      <p:cBhvr>
+                                        <p:cTn id="11" dur="1" fill="hold">
+                                          <p:stCondLst>
+                                            <p:cond delay="0"/>
+                                          </p:stCondLst>
+                                        </p:cTn>
+                                        <p:tgtEl>
+                                          <p:spTgt spid="3">
+                                            <p:txEl>
+                                              <p:pRg st="2" end="2"/>
+                                            </p:txEl>
+                                          </p:spTgt>
+                                        </p:tgtEl>
+                                        <p:attrNameLst>
+                                          <p:attrName>style.visibility</p:attrName>
+                                        </p:attrNameLst>
+                                      </p:cBhvr>
+                                      <p:to>
+                                        <p:strVal val="visible"/>
+                                      </p:to>
+                                    </p:set>
+                                    <p:animEffect transition="in" filter="wipe(down)">
+                                      <p:cBhvr>
+                                        <p:cTn id="12" dur="500"/>
+                                        <p:tgtEl>
+                                          <p:spTgt spid="3">
+                                            <p:txEl>
+                                              <p:pRg st="2" end="2"/>
+                                            </p:txEl>
+                                          </p:spTgt>
+                                        </p:tgtEl>
+                                      </p:cBhvr>
+                                    </p:animEffect>
+                                  </p:childTnLst>
+                                </p:cTn>
+                              </p:par>
+                            </p:childTnLst>
+                          </p:cTn>
+                        </p:par>
+                      </p:childTnLst>
+                    </p:cTn>
+                  </p:par>
+                  <p:par>
+                    <p:cTn id="13" fill="hold">
+                      <p:stCondLst>
+                        <p:cond delay="indefinite"/>
+                      </p:stCondLst>
+                      <p:childTnLst>
+                        <p:par>
+                          <p:cTn id="14" fill="hold">
+                            <p:stCondLst>
+                              <p:cond delay="0"/>
+                            </p:stCondLst>
+                            <p:childTnLst>
+                              <p:par>
+                                <p:cTn id="15" presetID="22" presetClass="entr" presetSubtype="4" fill="hold" grpId="0" nodeType="clickEffect">
+                                  <p:stCondLst>
+                                    <p:cond delay="0"/>
+                                  </p:stCondLst>
+                                  <p:childTnLst>
+                                    <p:set>
+                                      <p:cBhvr>
+                                        <p:cTn id="16" dur="1" fill="hold">
+                                          <p:stCondLst>
+                                            <p:cond delay="0"/>
+                                          </p:stCondLst>
+                                        </p:cTn>
+                                        <p:tgtEl>
+                                          <p:spTgt spid="3">
+                                            <p:txEl>
+                                              <p:pRg st="4" end="4"/>
+                                            </p:txEl>
+                                          </p:spTgt>
+                                        </p:tgtEl>
+                                        <p:attrNameLst>
+                                          <p:attrName>style.visibility</p:attrName>
+                                        </p:attrNameLst>
+                                      </p:cBhvr>
+                                      <p:to>
+                                        <p:strVal val="visible"/>
+                                      </p:to>
+                                    </p:set>
+                                    <p:animEffect transition="in" filter="wipe(down)">
+                                      <p:cBhvr>
+                                        <p:cTn id="17" dur="500"/>
+                                        <p:tgtEl>
+                                          <p:spTgt spid="3">
+                                            <p:txEl>
+                                              <p:pRg st="4" end="4"/>
+                                            </p:txEl>
+                                          </p:spTgt>
+                                        </p:tgtEl>
+                                      </p:cBhvr>
+                                    </p:animEffect>
+                                  </p:childTnLst>
+                                </p:cTn>
+                              </p:par>
+                            </p:childTnLst>
+                          </p:cTn>
+                        </p:par>
+                      </p:childTnLst>
+                    </p:cTn>
+                  </p:par>
+                  <p:par>
+                    <p:cTn id="18" fill="hold">
+                      <p:stCondLst>
+                        <p:cond delay="indefinite"/>
+                      </p:stCondLst>
+                      <p:childTnLst>
+                        <p:par>
+                          <p:cTn id="19" fill="hold">
+                            <p:stCondLst>
+                              <p:cond delay="0"/>
+                            </p:stCondLst>
+                            <p:childTnLst>
+                              <p:par>
+                                <p:cTn id="20" presetID="22" presetClass="entr" presetSubtype="4" fill="hold" grpId="0" nodeType="clickEffect">
+                                  <p:stCondLst>
+                                    <p:cond delay="0"/>
+                                  </p:stCondLst>
+                                  <p:childTnLst>
+                                    <p:set>
+                                      <p:cBhvr>
+                                        <p:cTn id="21" dur="1" fill="hold">
+                                          <p:stCondLst>
+                                            <p:cond delay="0"/>
+                                          </p:stCondLst>
+                                        </p:cTn>
+                                        <p:tgtEl>
+                                          <p:spTgt spid="3">
+                                            <p:txEl>
+                                              <p:pRg st="6" end="6"/>
+                                            </p:txEl>
+                                          </p:spTgt>
+                                        </p:tgtEl>
+                                        <p:attrNameLst>
+                                          <p:attrName>style.visibility</p:attrName>
+                                        </p:attrNameLst>
+                                      </p:cBhvr>
+                                      <p:to>
+                                        <p:strVal val="visible"/>
+                                      </p:to>
+                                    </p:set>
+                                    <p:animEffect transition="in" filter="wipe(down)">
+                                      <p:cBhvr>
+                                        <p:cTn id="22" dur="500"/>
+                                        <p:tgtEl>
+                                          <p:spTgt spid="3">
+                                            <p:txEl>
+                                              <p:pRg st="6" end="6"/>
+                                            </p:txEl>
+                                          </p:spTgt>
+                                        </p:tgtEl>
+                                      </p:cBhvr>
+                                    </p:animEffect>
+                                  </p:childTnLst>
+                                </p:cTn>
+                              </p:par>
+                            </p:childTnLst>
+                          </p:cTn>
+                        </p:par>
+                      </p:childTnLst>
+                    </p:cTn>
+                  </p:par>
+                </p:childTnLst>
+              </p:cTn>
+              <p:prevCondLst>
+                <p:cond evt="onPrev" delay="0">
+                  <p:tgtEl>
+                    <p:sldTgt/>
+                  </p:tgtEl>
+                </p:cond>
+              </p:prevCondLst>
+              <p:nextCondLst>
+                <p:cond evt="onNext" delay="0">
+                  <p:tgtEl>
+                    <p:sldTgt/>
+                  </p:tgtEl>
+                </p:cond>
+              </p:nextCondLst>
+            </p:seq>
+          </p:childTnLst>
+        </p:cTn>
+      </p:par>
+    </p:tnLst>
+    <p:bldLst>
+      <p:bldP spid="3" grpId="0" build="p"/>
+    </p:bldLst>
+  </p:timing>
 </p:sld>
 </file>
 
 <file path=ppt/slides/slide5.xml><?xml version="1.0" encoding="utf-8"?>
 <p:sld xmlns:a="http://schemas.openxmlformats.org/drawingml/2006/main" xmlns:r="http://schemas.openxmlformats.org/officeDocument/2006/relationships" xmlns:p="http://schemas.openxmlformats.org/presentationml/2006/main">
   <p:cSld>
+    <p:bg>
+      <p:bgPr>
+        <a:solidFill>
+          <a:schemeClr val="accent5">
+            <a:lumMod val="20000"/>
+            <a:lumOff val="80000"/>
+          </a:schemeClr>
+        </a:solidFill>
+        <a:effectLst/>
+      </p:bgPr>
+    </p:bg>
     <p:spTree>
       <p:nvGrpSpPr>
         <p:cNvPr id="1" name=""/>
@@ -4088,12 +5119,300 @@
   <p:clrMapOvr>
     <a:masterClrMapping/>
   </p:clrMapOvr>
+  <p:timing>
+    <p:tnLst>
+      <p:par>
+        <p:cTn id="1" dur="indefinite" restart="never" nodeType="tmRoot">
+          <p:childTnLst>
+            <p:seq concurrent="1" nextAc="seek">
+              <p:cTn id="2" dur="indefinite" nodeType="mainSeq">
+                <p:childTnLst>
+                  <p:par>
+                    <p:cTn id="3" fill="hold">
+                      <p:stCondLst>
+                        <p:cond delay="indefinite"/>
+                      </p:stCondLst>
+                      <p:childTnLst>
+                        <p:par>
+                          <p:cTn id="4" fill="hold">
+                            <p:stCondLst>
+                              <p:cond delay="0"/>
+                            </p:stCondLst>
+                            <p:childTnLst>
+                              <p:par>
+                                <p:cTn id="5" presetID="22" presetClass="entr" presetSubtype="4" fill="hold" grpId="0" nodeType="clickEffect">
+                                  <p:stCondLst>
+                                    <p:cond delay="0"/>
+                                  </p:stCondLst>
+                                  <p:childTnLst>
+                                    <p:set>
+                                      <p:cBhvr>
+                                        <p:cTn id="6" dur="1" fill="hold">
+                                          <p:stCondLst>
+                                            <p:cond delay="0"/>
+                                          </p:stCondLst>
+                                        </p:cTn>
+                                        <p:tgtEl>
+                                          <p:spTgt spid="3">
+                                            <p:txEl>
+                                              <p:pRg st="0" end="0"/>
+                                            </p:txEl>
+                                          </p:spTgt>
+                                        </p:tgtEl>
+                                        <p:attrNameLst>
+                                          <p:attrName>style.visibility</p:attrName>
+                                        </p:attrNameLst>
+                                      </p:cBhvr>
+                                      <p:to>
+                                        <p:strVal val="visible"/>
+                                      </p:to>
+                                    </p:set>
+                                    <p:animEffect transition="in" filter="wipe(down)">
+                                      <p:cBhvr>
+                                        <p:cTn id="7" dur="500"/>
+                                        <p:tgtEl>
+                                          <p:spTgt spid="3">
+                                            <p:txEl>
+                                              <p:pRg st="0" end="0"/>
+                                            </p:txEl>
+                                          </p:spTgt>
+                                        </p:tgtEl>
+                                      </p:cBhvr>
+                                    </p:animEffect>
+                                  </p:childTnLst>
+                                </p:cTn>
+                              </p:par>
+                            </p:childTnLst>
+                          </p:cTn>
+                        </p:par>
+                      </p:childTnLst>
+                    </p:cTn>
+                  </p:par>
+                  <p:par>
+                    <p:cTn id="8" fill="hold">
+                      <p:stCondLst>
+                        <p:cond delay="indefinite"/>
+                      </p:stCondLst>
+                      <p:childTnLst>
+                        <p:par>
+                          <p:cTn id="9" fill="hold">
+                            <p:stCondLst>
+                              <p:cond delay="0"/>
+                            </p:stCondLst>
+                            <p:childTnLst>
+                              <p:par>
+                                <p:cTn id="10" presetID="22" presetClass="entr" presetSubtype="4" fill="hold" grpId="0" nodeType="clickEffect">
+                                  <p:stCondLst>
+                                    <p:cond delay="0"/>
+                                  </p:stCondLst>
+                                  <p:childTnLst>
+                                    <p:set>
+                                      <p:cBhvr>
+                                        <p:cTn id="11" dur="1" fill="hold">
+                                          <p:stCondLst>
+                                            <p:cond delay="0"/>
+                                          </p:stCondLst>
+                                        </p:cTn>
+                                        <p:tgtEl>
+                                          <p:spTgt spid="3">
+                                            <p:txEl>
+                                              <p:pRg st="2" end="2"/>
+                                            </p:txEl>
+                                          </p:spTgt>
+                                        </p:tgtEl>
+                                        <p:attrNameLst>
+                                          <p:attrName>style.visibility</p:attrName>
+                                        </p:attrNameLst>
+                                      </p:cBhvr>
+                                      <p:to>
+                                        <p:strVal val="visible"/>
+                                      </p:to>
+                                    </p:set>
+                                    <p:animEffect transition="in" filter="wipe(down)">
+                                      <p:cBhvr>
+                                        <p:cTn id="12" dur="500"/>
+                                        <p:tgtEl>
+                                          <p:spTgt spid="3">
+                                            <p:txEl>
+                                              <p:pRg st="2" end="2"/>
+                                            </p:txEl>
+                                          </p:spTgt>
+                                        </p:tgtEl>
+                                      </p:cBhvr>
+                                    </p:animEffect>
+                                  </p:childTnLst>
+                                </p:cTn>
+                              </p:par>
+                            </p:childTnLst>
+                          </p:cTn>
+                        </p:par>
+                      </p:childTnLst>
+                    </p:cTn>
+                  </p:par>
+                  <p:par>
+                    <p:cTn id="13" fill="hold">
+                      <p:stCondLst>
+                        <p:cond delay="indefinite"/>
+                      </p:stCondLst>
+                      <p:childTnLst>
+                        <p:par>
+                          <p:cTn id="14" fill="hold">
+                            <p:stCondLst>
+                              <p:cond delay="0"/>
+                            </p:stCondLst>
+                            <p:childTnLst>
+                              <p:par>
+                                <p:cTn id="15" presetID="22" presetClass="entr" presetSubtype="4" fill="hold" grpId="0" nodeType="clickEffect">
+                                  <p:stCondLst>
+                                    <p:cond delay="0"/>
+                                  </p:stCondLst>
+                                  <p:childTnLst>
+                                    <p:set>
+                                      <p:cBhvr>
+                                        <p:cTn id="16" dur="1" fill="hold">
+                                          <p:stCondLst>
+                                            <p:cond delay="0"/>
+                                          </p:stCondLst>
+                                        </p:cTn>
+                                        <p:tgtEl>
+                                          <p:spTgt spid="3">
+                                            <p:txEl>
+                                              <p:pRg st="4" end="4"/>
+                                            </p:txEl>
+                                          </p:spTgt>
+                                        </p:tgtEl>
+                                        <p:attrNameLst>
+                                          <p:attrName>style.visibility</p:attrName>
+                                        </p:attrNameLst>
+                                      </p:cBhvr>
+                                      <p:to>
+                                        <p:strVal val="visible"/>
+                                      </p:to>
+                                    </p:set>
+                                    <p:animEffect transition="in" filter="wipe(down)">
+                                      <p:cBhvr>
+                                        <p:cTn id="17" dur="500"/>
+                                        <p:tgtEl>
+                                          <p:spTgt spid="3">
+                                            <p:txEl>
+                                              <p:pRg st="4" end="4"/>
+                                            </p:txEl>
+                                          </p:spTgt>
+                                        </p:tgtEl>
+                                      </p:cBhvr>
+                                    </p:animEffect>
+                                  </p:childTnLst>
+                                </p:cTn>
+                              </p:par>
+                            </p:childTnLst>
+                          </p:cTn>
+                        </p:par>
+                      </p:childTnLst>
+                    </p:cTn>
+                  </p:par>
+                  <p:par>
+                    <p:cTn id="18" fill="hold">
+                      <p:stCondLst>
+                        <p:cond delay="indefinite"/>
+                      </p:stCondLst>
+                      <p:childTnLst>
+                        <p:par>
+                          <p:cTn id="19" fill="hold">
+                            <p:stCondLst>
+                              <p:cond delay="0"/>
+                            </p:stCondLst>
+                            <p:childTnLst>
+                              <p:par>
+                                <p:cTn id="20" presetID="22" presetClass="entr" presetSubtype="4" fill="hold" grpId="0" nodeType="clickEffect">
+                                  <p:stCondLst>
+                                    <p:cond delay="0"/>
+                                  </p:stCondLst>
+                                  <p:childTnLst>
+                                    <p:set>
+                                      <p:cBhvr>
+                                        <p:cTn id="21" dur="1" fill="hold">
+                                          <p:stCondLst>
+                                            <p:cond delay="0"/>
+                                          </p:stCondLst>
+                                        </p:cTn>
+                                        <p:tgtEl>
+                                          <p:spTgt spid="3">
+                                            <p:txEl>
+                                              <p:pRg st="6" end="6"/>
+                                            </p:txEl>
+                                          </p:spTgt>
+                                        </p:tgtEl>
+                                        <p:attrNameLst>
+                                          <p:attrName>style.visibility</p:attrName>
+                                        </p:attrNameLst>
+                                      </p:cBhvr>
+                                      <p:to>
+                                        <p:strVal val="visible"/>
+                                      </p:to>
+                                    </p:set>
+                                    <p:animEffect transition="in" filter="wipe(down)">
+                                      <p:cBhvr>
+                                        <p:cTn id="22" dur="500"/>
+                                        <p:tgtEl>
+                                          <p:spTgt spid="3">
+                                            <p:txEl>
+                                              <p:pRg st="6" end="6"/>
+                                            </p:txEl>
+                                          </p:spTgt>
+                                        </p:tgtEl>
+                                      </p:cBhvr>
+                                    </p:animEffect>
+                                  </p:childTnLst>
+                                </p:cTn>
+                              </p:par>
+                            </p:childTnLst>
+                          </p:cTn>
+                        </p:par>
+                      </p:childTnLst>
+                    </p:cTn>
+                  </p:par>
+                </p:childTnLst>
+              </p:cTn>
+              <p:prevCondLst>
+                <p:cond evt="onPrev" delay="0">
+                  <p:tgtEl>
+                    <p:sldTgt/>
+                  </p:tgtEl>
+                </p:cond>
+              </p:prevCondLst>
+              <p:nextCondLst>
+                <p:cond evt="onNext" delay="0">
+                  <p:tgtEl>
+                    <p:sldTgt/>
+                  </p:tgtEl>
+                </p:cond>
+              </p:nextCondLst>
+            </p:seq>
+          </p:childTnLst>
+        </p:cTn>
+      </p:par>
+    </p:tnLst>
+    <p:bldLst>
+      <p:bldP spid="3" grpId="0" build="p"/>
+    </p:bldLst>
+  </p:timing>
 </p:sld>
 </file>
 
 <file path=ppt/slides/slide6.xml><?xml version="1.0" encoding="utf-8"?>
 <p:sld xmlns:a="http://schemas.openxmlformats.org/drawingml/2006/main" xmlns:r="http://schemas.openxmlformats.org/officeDocument/2006/relationships" xmlns:p="http://schemas.openxmlformats.org/presentationml/2006/main">
   <p:cSld>
+    <p:bg>
+      <p:bgPr>
+        <a:solidFill>
+          <a:schemeClr val="accent6">
+            <a:lumMod val="20000"/>
+            <a:lumOff val="80000"/>
+          </a:schemeClr>
+        </a:solidFill>
+        <a:effectLst/>
+      </p:bgPr>
+    </p:bg>
     <p:spTree>
       <p:nvGrpSpPr>
         <p:cNvPr id="1" name=""/>
@@ -4175,6 +5494,9 @@
             </a:r>
           </a:p>
           <a:p>
+            <a:pPr marL="0" indent="0">
+              <a:buNone/>
+            </a:pPr>
             <a:endParaRPr lang="es-AR" sz="6600" dirty="0">
               <a:latin typeface="Arial" panose="020B0604020202020204" pitchFamily="34" charset="0"/>
               <a:cs typeface="Arial" panose="020B0604020202020204" pitchFamily="34" charset="0"/>
@@ -4194,6 +5516,94 @@
           </a:p>
         </p:txBody>
       </p:sp>
+      <p:sp>
+        <p:nvSpPr>
+          <p:cNvPr id="4" name="CuadroTexto 3">
+            <a:extLst>
+              <a:ext uri="{FF2B5EF4-FFF2-40B4-BE49-F238E27FC236}">
+                <a16:creationId xmlns:a16="http://schemas.microsoft.com/office/drawing/2014/main" id="{996E4BA5-D4E0-4996-9712-F9320E124C75}"/>
+              </a:ext>
+            </a:extLst>
+          </p:cNvPr>
+          <p:cNvSpPr txBox="1"/>
+          <p:nvPr/>
+        </p:nvSpPr>
+        <p:spPr>
+          <a:xfrm>
+            <a:off x="1213390" y="3593931"/>
+            <a:ext cx="9473670" cy="1446550"/>
+          </a:xfrm>
+          <a:prstGeom prst="rect">
+            <a:avLst/>
+          </a:prstGeom>
+          <a:noFill/>
+        </p:spPr>
+        <p:txBody>
+          <a:bodyPr wrap="square" rtlCol="0">
+            <a:spAutoFit/>
+          </a:bodyPr>
+          <a:lstStyle/>
+          <a:p>
+            <a:pPr algn="ctr"/>
+            <a:r>
+              <a:rPr lang="es-AR" sz="8800" dirty="0">
+                <a:latin typeface="Bahnschrift Light" panose="020B0502040204020203" pitchFamily="34" charset="0"/>
+              </a:rPr>
+              <a:t>¿</a:t>
+            </a:r>
+            <a:r>
+              <a:rPr lang="es-AR" sz="8800" dirty="0">
+                <a:latin typeface="Arial Rounded MT Bold" panose="020F0704030504030204" pitchFamily="34" charset="0"/>
+              </a:rPr>
+              <a:t>Preguntas</a:t>
+            </a:r>
+            <a:r>
+              <a:rPr lang="es-AR" sz="8800" dirty="0">
+                <a:latin typeface="Bahnschrift Light" panose="020B0502040204020203" pitchFamily="34" charset="0"/>
+              </a:rPr>
+              <a:t>?</a:t>
+            </a:r>
+          </a:p>
+        </p:txBody>
+      </p:sp>
+      <p:pic>
+        <p:nvPicPr>
+          <p:cNvPr id="5" name="Picture 2" descr="https://www.que.es/wp-content/uploads/2017/03/sobre-la-entrevista-de-trabajo2_n-640x390.jpg">
+            <a:extLst>
+              <a:ext uri="{FF2B5EF4-FFF2-40B4-BE49-F238E27FC236}">
+                <a16:creationId xmlns:a16="http://schemas.microsoft.com/office/drawing/2014/main" id="{988458AD-D4A1-4FA1-9657-D704416B0A4F}"/>
+              </a:ext>
+            </a:extLst>
+          </p:cNvPr>
+          <p:cNvPicPr>
+            <a:picLocks noChangeAspect="1" noChangeArrowheads="1"/>
+          </p:cNvPicPr>
+          <p:nvPr/>
+        </p:nvPicPr>
+        <p:blipFill>
+          <a:blip r:embed="rId2">
+            <a:extLst>
+              <a:ext uri="{28A0092B-C50C-407E-A947-70E740481C1C}">
+                <a14:useLocalDpi xmlns:a14="http://schemas.microsoft.com/office/drawing/2010/main" val="0"/>
+              </a:ext>
+            </a:extLst>
+          </a:blip>
+          <a:srcRect/>
+          <a:stretch>
+            <a:fillRect/>
+          </a:stretch>
+        </p:blipFill>
+        <p:spPr bwMode="auto">
+          <a:xfrm>
+            <a:off x="8027646" y="1027375"/>
+            <a:ext cx="3471929" cy="2115707"/>
+          </a:xfrm>
+          <a:prstGeom prst="rect">
+            <a:avLst/>
+          </a:prstGeom>
+          <a:noFill/>
+        </p:spPr>
+      </p:pic>
     </p:spTree>
     <p:extLst>
       <p:ext uri="{BB962C8B-B14F-4D97-AF65-F5344CB8AC3E}">
@@ -4204,86 +5614,235 @@
   <p:clrMapOvr>
     <a:masterClrMapping/>
   </p:clrMapOvr>
-</p:sld>
-</file>
-
-<file path=ppt/slides/slide7.xml><?xml version="1.0" encoding="utf-8"?>
-<p:sld xmlns:a="http://schemas.openxmlformats.org/drawingml/2006/main" xmlns:r="http://schemas.openxmlformats.org/officeDocument/2006/relationships" xmlns:p="http://schemas.openxmlformats.org/presentationml/2006/main">
-  <p:cSld>
-    <p:spTree>
-      <p:nvGrpSpPr>
-        <p:cNvPr id="1" name=""/>
-        <p:cNvGrpSpPr/>
-        <p:nvPr/>
-      </p:nvGrpSpPr>
-      <p:grpSpPr>
-        <a:xfrm>
-          <a:off x="0" y="0"/>
-          <a:ext cx="0" cy="0"/>
-          <a:chOff x="0" y="0"/>
-          <a:chExt cx="0" cy="0"/>
-        </a:xfrm>
-      </p:grpSpPr>
-      <p:sp>
-        <p:nvSpPr>
-          <p:cNvPr id="2" name="Título 1">
-            <a:extLst>
-              <a:ext uri="{FF2B5EF4-FFF2-40B4-BE49-F238E27FC236}">
-                <a16:creationId xmlns:a16="http://schemas.microsoft.com/office/drawing/2014/main" id="{629F8D06-1C1E-4622-B5AD-CDB3C6D3F7FF}"/>
-              </a:ext>
-            </a:extLst>
-          </p:cNvPr>
-          <p:cNvSpPr>
-            <a:spLocks noGrp="1"/>
-          </p:cNvSpPr>
-          <p:nvPr>
-            <p:ph type="title"/>
-          </p:nvPr>
-        </p:nvSpPr>
-        <p:spPr/>
-        <p:txBody>
-          <a:bodyPr/>
-          <a:lstStyle/>
-          <a:p>
-            <a:endParaRPr lang="es-AR" dirty="0"/>
-          </a:p>
-        </p:txBody>
-      </p:sp>
-      <p:sp>
-        <p:nvSpPr>
-          <p:cNvPr id="3" name="Marcador de contenido 2">
-            <a:extLst>
-              <a:ext uri="{FF2B5EF4-FFF2-40B4-BE49-F238E27FC236}">
-                <a16:creationId xmlns:a16="http://schemas.microsoft.com/office/drawing/2014/main" id="{F71CAA7D-BC84-4611-B376-557524A7C5AC}"/>
-              </a:ext>
-            </a:extLst>
-          </p:cNvPr>
-          <p:cNvSpPr>
-            <a:spLocks noGrp="1"/>
-          </p:cNvSpPr>
-          <p:nvPr>
-            <p:ph idx="1"/>
-          </p:nvPr>
-        </p:nvSpPr>
-        <p:spPr/>
-        <p:txBody>
-          <a:bodyPr/>
-          <a:lstStyle/>
-          <a:p>
-            <a:endParaRPr lang="es-AR"/>
-          </a:p>
-        </p:txBody>
-      </p:sp>
-    </p:spTree>
-    <p:extLst>
-      <p:ext uri="{BB962C8B-B14F-4D97-AF65-F5344CB8AC3E}">
-        <p14:creationId xmlns:p14="http://schemas.microsoft.com/office/powerpoint/2010/main" val="75068777"/>
-      </p:ext>
-    </p:extLst>
-  </p:cSld>
-  <p:clrMapOvr>
-    <a:masterClrMapping/>
-  </p:clrMapOvr>
+  <p:timing>
+    <p:tnLst>
+      <p:par>
+        <p:cTn id="1" dur="indefinite" restart="never" nodeType="tmRoot">
+          <p:childTnLst>
+            <p:seq concurrent="1" nextAc="seek">
+              <p:cTn id="2" dur="indefinite" nodeType="mainSeq">
+                <p:childTnLst>
+                  <p:par>
+                    <p:cTn id="3" fill="hold">
+                      <p:stCondLst>
+                        <p:cond delay="indefinite"/>
+                      </p:stCondLst>
+                      <p:childTnLst>
+                        <p:par>
+                          <p:cTn id="4" fill="hold">
+                            <p:stCondLst>
+                              <p:cond delay="0"/>
+                            </p:stCondLst>
+                            <p:childTnLst>
+                              <p:par>
+                                <p:cTn id="5" presetID="22" presetClass="entr" presetSubtype="4" fill="hold" grpId="0" nodeType="clickEffect">
+                                  <p:stCondLst>
+                                    <p:cond delay="0"/>
+                                  </p:stCondLst>
+                                  <p:childTnLst>
+                                    <p:set>
+                                      <p:cBhvr>
+                                        <p:cTn id="6" dur="1" fill="hold">
+                                          <p:stCondLst>
+                                            <p:cond delay="0"/>
+                                          </p:stCondLst>
+                                        </p:cTn>
+                                        <p:tgtEl>
+                                          <p:spTgt spid="3">
+                                            <p:txEl>
+                                              <p:pRg st="0" end="0"/>
+                                            </p:txEl>
+                                          </p:spTgt>
+                                        </p:tgtEl>
+                                        <p:attrNameLst>
+                                          <p:attrName>style.visibility</p:attrName>
+                                        </p:attrNameLst>
+                                      </p:cBhvr>
+                                      <p:to>
+                                        <p:strVal val="visible"/>
+                                      </p:to>
+                                    </p:set>
+                                    <p:animEffect transition="in" filter="wipe(down)">
+                                      <p:cBhvr>
+                                        <p:cTn id="7" dur="500"/>
+                                        <p:tgtEl>
+                                          <p:spTgt spid="3">
+                                            <p:txEl>
+                                              <p:pRg st="0" end="0"/>
+                                            </p:txEl>
+                                          </p:spTgt>
+                                        </p:tgtEl>
+                                      </p:cBhvr>
+                                    </p:animEffect>
+                                  </p:childTnLst>
+                                </p:cTn>
+                              </p:par>
+                              <p:par>
+                                <p:cTn id="8" presetID="22" presetClass="entr" presetSubtype="4" fill="hold" nodeType="withEffect">
+                                  <p:stCondLst>
+                                    <p:cond delay="0"/>
+                                  </p:stCondLst>
+                                  <p:childTnLst>
+                                    <p:set>
+                                      <p:cBhvr>
+                                        <p:cTn id="9" dur="1" fill="hold">
+                                          <p:stCondLst>
+                                            <p:cond delay="0"/>
+                                          </p:stCondLst>
+                                        </p:cTn>
+                                        <p:tgtEl>
+                                          <p:spTgt spid="5"/>
+                                        </p:tgtEl>
+                                        <p:attrNameLst>
+                                          <p:attrName>style.visibility</p:attrName>
+                                        </p:attrNameLst>
+                                      </p:cBhvr>
+                                      <p:to>
+                                        <p:strVal val="visible"/>
+                                      </p:to>
+                                    </p:set>
+                                    <p:animEffect transition="in" filter="wipe(down)">
+                                      <p:cBhvr>
+                                        <p:cTn id="10" dur="500"/>
+                                        <p:tgtEl>
+                                          <p:spTgt spid="5"/>
+                                        </p:tgtEl>
+                                      </p:cBhvr>
+                                    </p:animEffect>
+                                  </p:childTnLst>
+                                </p:cTn>
+                              </p:par>
+                            </p:childTnLst>
+                          </p:cTn>
+                        </p:par>
+                      </p:childTnLst>
+                    </p:cTn>
+                  </p:par>
+                  <p:par>
+                    <p:cTn id="11" fill="hold">
+                      <p:stCondLst>
+                        <p:cond delay="indefinite"/>
+                      </p:stCondLst>
+                      <p:childTnLst>
+                        <p:par>
+                          <p:cTn id="12" fill="hold">
+                            <p:stCondLst>
+                              <p:cond delay="0"/>
+                            </p:stCondLst>
+                            <p:childTnLst>
+                              <p:par>
+                                <p:cTn id="13" presetID="53" presetClass="entr" presetSubtype="16" fill="hold" grpId="0" nodeType="clickEffect">
+                                  <p:stCondLst>
+                                    <p:cond delay="0"/>
+                                  </p:stCondLst>
+                                  <p:childTnLst>
+                                    <p:set>
+                                      <p:cBhvr>
+                                        <p:cTn id="14" dur="1" fill="hold">
+                                          <p:stCondLst>
+                                            <p:cond delay="0"/>
+                                          </p:stCondLst>
+                                        </p:cTn>
+                                        <p:tgtEl>
+                                          <p:spTgt spid="4"/>
+                                        </p:tgtEl>
+                                        <p:attrNameLst>
+                                          <p:attrName>style.visibility</p:attrName>
+                                        </p:attrNameLst>
+                                      </p:cBhvr>
+                                      <p:to>
+                                        <p:strVal val="visible"/>
+                                      </p:to>
+                                    </p:set>
+                                    <p:anim calcmode="lin" valueType="num">
+                                      <p:cBhvr>
+                                        <p:cTn id="15" dur="2000" fill="hold"/>
+                                        <p:tgtEl>
+                                          <p:spTgt spid="4"/>
+                                        </p:tgtEl>
+                                        <p:attrNameLst>
+                                          <p:attrName>ppt_w</p:attrName>
+                                        </p:attrNameLst>
+                                      </p:cBhvr>
+                                      <p:tavLst>
+                                        <p:tav tm="0">
+                                          <p:val>
+                                            <p:fltVal val="0"/>
+                                          </p:val>
+                                        </p:tav>
+                                        <p:tav tm="100000">
+                                          <p:val>
+                                            <p:strVal val="#ppt_w"/>
+                                          </p:val>
+                                        </p:tav>
+                                      </p:tavLst>
+                                    </p:anim>
+                                    <p:anim calcmode="lin" valueType="num">
+                                      <p:cBhvr>
+                                        <p:cTn id="16" dur="2000" fill="hold"/>
+                                        <p:tgtEl>
+                                          <p:spTgt spid="4"/>
+                                        </p:tgtEl>
+                                        <p:attrNameLst>
+                                          <p:attrName>ppt_h</p:attrName>
+                                        </p:attrNameLst>
+                                      </p:cBhvr>
+                                      <p:tavLst>
+                                        <p:tav tm="0">
+                                          <p:val>
+                                            <p:fltVal val="0"/>
+                                          </p:val>
+                                        </p:tav>
+                                        <p:tav tm="100000">
+                                          <p:val>
+                                            <p:strVal val="#ppt_h"/>
+                                          </p:val>
+                                        </p:tav>
+                                      </p:tavLst>
+                                    </p:anim>
+                                    <p:animEffect transition="in" filter="fade">
+                                      <p:cBhvr>
+                                        <p:cTn id="17" dur="2000"/>
+                                        <p:tgtEl>
+                                          <p:spTgt spid="4"/>
+                                        </p:tgtEl>
+                                      </p:cBhvr>
+                                    </p:animEffect>
+                                  </p:childTnLst>
+                                </p:cTn>
+                              </p:par>
+                            </p:childTnLst>
+                          </p:cTn>
+                        </p:par>
+                      </p:childTnLst>
+                    </p:cTn>
+                  </p:par>
+                </p:childTnLst>
+              </p:cTn>
+              <p:prevCondLst>
+                <p:cond evt="onPrev" delay="0">
+                  <p:tgtEl>
+                    <p:sldTgt/>
+                  </p:tgtEl>
+                </p:cond>
+              </p:prevCondLst>
+              <p:nextCondLst>
+                <p:cond evt="onNext" delay="0">
+                  <p:tgtEl>
+                    <p:sldTgt/>
+                  </p:tgtEl>
+                </p:cond>
+              </p:nextCondLst>
+            </p:seq>
+          </p:childTnLst>
+        </p:cTn>
+      </p:par>
+    </p:tnLst>
+    <p:bldLst>
+      <p:bldP spid="3" grpId="0" build="p"/>
+      <p:bldP spid="4" grpId="0"/>
+    </p:bldLst>
+  </p:timing>
 </p:sld>
 </file>
 

</xml_diff>